<commit_message>
modified: Presentation, added text for OCR slides
</commit_message>
<xml_diff>
--- a/project/presentation.pptx
+++ b/project/presentation.pptx
@@ -293,7 +293,7 @@
           <a:p>
             <a:fld id="{95958476-0E0D-41FB-AEF8-71DC4C6B8094}" type="slidenum">
               <a:rPr lang="en-CH" smtClean="0"/>
-              <a:t>‹#›</a:t>
+              <a:t>‹N°›</a:t>
             </a:fld>
             <a:endParaRPr lang="en-CH"/>
           </a:p>
@@ -551,7 +551,7 @@
           <a:p>
             <a:fld id="{8D831FAA-BA95-4114-814B-804161916173}" type="slidenum">
               <a:rPr lang="en-CH" smtClean="0"/>
-              <a:t>‹#›</a:t>
+              <a:t>‹N°›</a:t>
             </a:fld>
             <a:endParaRPr lang="en-CH"/>
           </a:p>
@@ -1393,7 +1393,7 @@
           <a:p>
             <a:fld id="{D3EB5E2A-433B-448B-927D-175968ECC449}" type="slidenum">
               <a:rPr lang="en-CH" smtClean="0"/>
-              <a:t>‹#›</a:t>
+              <a:t>‹N°›</a:t>
             </a:fld>
             <a:endParaRPr lang="en-CH"/>
           </a:p>
@@ -1592,7 +1592,7 @@
           <a:p>
             <a:fld id="{D3EB5E2A-433B-448B-927D-175968ECC449}" type="slidenum">
               <a:rPr lang="en-CH" smtClean="0"/>
-              <a:t>‹#›</a:t>
+              <a:t>‹N°›</a:t>
             </a:fld>
             <a:endParaRPr lang="en-CH"/>
           </a:p>
@@ -1801,7 +1801,7 @@
           <a:p>
             <a:fld id="{D3EB5E2A-433B-448B-927D-175968ECC449}" type="slidenum">
               <a:rPr lang="en-CH" smtClean="0"/>
-              <a:t>‹#›</a:t>
+              <a:t>‹N°›</a:t>
             </a:fld>
             <a:endParaRPr lang="en-CH"/>
           </a:p>
@@ -2010,7 +2010,7 @@
           <a:p>
             <a:fld id="{D3EB5E2A-433B-448B-927D-175968ECC449}" type="slidenum">
               <a:rPr lang="en-CH" smtClean="0"/>
-              <a:t>‹#›</a:t>
+              <a:t>‹N°›</a:t>
             </a:fld>
             <a:endParaRPr lang="en-CH"/>
           </a:p>
@@ -2285,7 +2285,7 @@
           <a:p>
             <a:fld id="{D3EB5E2A-433B-448B-927D-175968ECC449}" type="slidenum">
               <a:rPr lang="en-CH" smtClean="0"/>
-              <a:t>‹#›</a:t>
+              <a:t>‹N°›</a:t>
             </a:fld>
             <a:endParaRPr lang="en-CH"/>
           </a:p>
@@ -2552,7 +2552,7 @@
           <a:p>
             <a:fld id="{D3EB5E2A-433B-448B-927D-175968ECC449}" type="slidenum">
               <a:rPr lang="en-CH" smtClean="0"/>
-              <a:t>‹#›</a:t>
+              <a:t>‹N°›</a:t>
             </a:fld>
             <a:endParaRPr lang="en-CH"/>
           </a:p>
@@ -2966,7 +2966,7 @@
           <a:p>
             <a:fld id="{D3EB5E2A-433B-448B-927D-175968ECC449}" type="slidenum">
               <a:rPr lang="en-CH" smtClean="0"/>
-              <a:t>‹#›</a:t>
+              <a:t>‹N°›</a:t>
             </a:fld>
             <a:endParaRPr lang="en-CH"/>
           </a:p>
@@ -3107,7 +3107,7 @@
           <a:p>
             <a:fld id="{D3EB5E2A-433B-448B-927D-175968ECC449}" type="slidenum">
               <a:rPr lang="en-CH" smtClean="0"/>
-              <a:t>‹#›</a:t>
+              <a:t>‹N°›</a:t>
             </a:fld>
             <a:endParaRPr lang="en-CH"/>
           </a:p>
@@ -3219,7 +3219,7 @@
           <a:p>
             <a:fld id="{D3EB5E2A-433B-448B-927D-175968ECC449}" type="slidenum">
               <a:rPr lang="en-CH" smtClean="0"/>
-              <a:t>‹#›</a:t>
+              <a:t>‹N°›</a:t>
             </a:fld>
             <a:endParaRPr lang="en-CH"/>
           </a:p>
@@ -3531,7 +3531,7 @@
           <a:p>
             <a:fld id="{D3EB5E2A-433B-448B-927D-175968ECC449}" type="slidenum">
               <a:rPr lang="en-CH" smtClean="0"/>
-              <a:t>‹#›</a:t>
+              <a:t>‹N°›</a:t>
             </a:fld>
             <a:endParaRPr lang="en-CH"/>
           </a:p>
@@ -3819,7 +3819,7 @@
           <a:p>
             <a:fld id="{D3EB5E2A-433B-448B-927D-175968ECC449}" type="slidenum">
               <a:rPr lang="en-CH" smtClean="0"/>
-              <a:t>‹#›</a:t>
+              <a:t>‹N°›</a:t>
             </a:fld>
             <a:endParaRPr lang="en-CH"/>
           </a:p>
@@ -4097,7 +4097,7 @@
           <a:p>
             <a:fld id="{D3EB5E2A-433B-448B-927D-175968ECC449}" type="slidenum">
               <a:rPr lang="en-CH" smtClean="0"/>
-              <a:t>‹#›</a:t>
+              <a:t>‹N°›</a:t>
             </a:fld>
             <a:endParaRPr lang="en-CH" dirty="0"/>
           </a:p>
@@ -5414,18 +5414,47 @@
       </p:sp>
       <p:sp>
         <p:nvSpPr>
-          <p:cNvPr id="3" name="Content Placeholder 2">
-            <a:extLst>
-              <a:ext uri="{FF2B5EF4-FFF2-40B4-BE49-F238E27FC236}">
-                <a16:creationId xmlns:a16="http://schemas.microsoft.com/office/drawing/2014/main" id="{D820A932-C390-4A3A-80DC-003C4B5E693C}"/>
-              </a:ext>
-            </a:extLst>
-          </p:cNvPr>
-          <p:cNvSpPr>
-            <a:spLocks noGrp="1"/>
-          </p:cNvSpPr>
-          <p:nvPr>
-            <p:ph idx="1"/>
+          <p:cNvPr id="6" name="Espace réservé du texte 5">
+            <a:extLst>
+              <a:ext uri="{FF2B5EF4-FFF2-40B4-BE49-F238E27FC236}">
+                <a16:creationId xmlns:a16="http://schemas.microsoft.com/office/drawing/2014/main" id="{B87720CE-A241-411B-BD61-831F71D58AEC}"/>
+              </a:ext>
+            </a:extLst>
+          </p:cNvPr>
+          <p:cNvSpPr>
+            <a:spLocks noGrp="1"/>
+          </p:cNvSpPr>
+          <p:nvPr>
+            <p:ph type="body" idx="1"/>
+          </p:nvPr>
+        </p:nvSpPr>
+        <p:spPr/>
+        <p:txBody>
+          <a:bodyPr/>
+          <a:lstStyle/>
+          <a:p>
+            <a:r>
+              <a:rPr lang="fr-CH" dirty="0"/>
+              <a:t>Digits</a:t>
+            </a:r>
+            <a:endParaRPr lang="en-US" dirty="0"/>
+          </a:p>
+        </p:txBody>
+      </p:sp>
+      <p:sp>
+        <p:nvSpPr>
+          <p:cNvPr id="7" name="Espace réservé du contenu 6">
+            <a:extLst>
+              <a:ext uri="{FF2B5EF4-FFF2-40B4-BE49-F238E27FC236}">
+                <a16:creationId xmlns:a16="http://schemas.microsoft.com/office/drawing/2014/main" id="{907901E9-80EE-4E19-AEA0-BB18E0D9FE3D}"/>
+              </a:ext>
+            </a:extLst>
+          </p:cNvPr>
+          <p:cNvSpPr>
+            <a:spLocks noGrp="1"/>
+          </p:cNvSpPr>
+          <p:nvPr>
+            <p:ph sz="half" idx="2"/>
           </p:nvPr>
         </p:nvSpPr>
         <p:spPr/>
@@ -5435,8 +5464,199 @@
           </a:bodyPr>
           <a:lstStyle/>
           <a:p>
+            <a:r>
+              <a:rPr lang="fr-CH" sz="2400" dirty="0"/>
+              <a:t>Multi layer perceptron</a:t>
+            </a:r>
+          </a:p>
+          <a:p>
+            <a:r>
+              <a:rPr lang="fr-CH" sz="2400" dirty="0"/>
+              <a:t>200 </a:t>
+            </a:r>
+            <a:r>
+              <a:rPr lang="fr-CH" sz="2400" dirty="0" err="1"/>
+              <a:t>layers</a:t>
+            </a:r>
+            <a:r>
+              <a:rPr lang="fr-CH" sz="2400" dirty="0"/>
+              <a:t> for </a:t>
+            </a:r>
+            <a:r>
+              <a:rPr lang="fr-CH" sz="2400" dirty="0" err="1"/>
+              <a:t>improved</a:t>
+            </a:r>
+            <a:r>
+              <a:rPr lang="fr-CH" sz="2400" dirty="0"/>
+              <a:t> </a:t>
+            </a:r>
+            <a:r>
+              <a:rPr lang="fr-CH" sz="2400" dirty="0" err="1"/>
+              <a:t>accuracy</a:t>
+            </a:r>
+            <a:endParaRPr lang="fr-CH" sz="2400" dirty="0"/>
+          </a:p>
+          <a:p>
+            <a:r>
+              <a:rPr lang="fr-CH" sz="2400" dirty="0"/>
+              <a:t>Training on MNIST</a:t>
+            </a:r>
+          </a:p>
+          <a:p>
+            <a:endParaRPr lang="en-US" sz="2400" dirty="0"/>
+          </a:p>
+        </p:txBody>
+      </p:sp>
+      <p:sp>
+        <p:nvSpPr>
+          <p:cNvPr id="8" name="Espace réservé du texte 7">
+            <a:extLst>
+              <a:ext uri="{FF2B5EF4-FFF2-40B4-BE49-F238E27FC236}">
+                <a16:creationId xmlns:a16="http://schemas.microsoft.com/office/drawing/2014/main" id="{8E5ED769-6539-44F6-9105-267D145F9FDB}"/>
+              </a:ext>
+            </a:extLst>
+          </p:cNvPr>
+          <p:cNvSpPr>
+            <a:spLocks noGrp="1"/>
+          </p:cNvSpPr>
+          <p:nvPr>
+            <p:ph type="body" sz="quarter" idx="3"/>
+          </p:nvPr>
+        </p:nvSpPr>
+        <p:spPr/>
+        <p:txBody>
+          <a:bodyPr/>
+          <a:lstStyle/>
+          <a:p>
+            <a:r>
+              <a:rPr lang="fr-CH" dirty="0" err="1"/>
+              <a:t>Signs</a:t>
+            </a:r>
+            <a:endParaRPr lang="en-US" dirty="0"/>
+          </a:p>
+        </p:txBody>
+      </p:sp>
+      <p:sp>
+        <p:nvSpPr>
+          <p:cNvPr id="9" name="Espace réservé du contenu 8">
+            <a:extLst>
+              <a:ext uri="{FF2B5EF4-FFF2-40B4-BE49-F238E27FC236}">
+                <a16:creationId xmlns:a16="http://schemas.microsoft.com/office/drawing/2014/main" id="{200229F1-C9CB-48A4-945F-6E328A78539F}"/>
+              </a:ext>
+            </a:extLst>
+          </p:cNvPr>
+          <p:cNvSpPr>
+            <a:spLocks noGrp="1"/>
+          </p:cNvSpPr>
+          <p:nvPr>
+            <p:ph sz="quarter" idx="4"/>
+          </p:nvPr>
+        </p:nvSpPr>
+        <p:spPr/>
+        <p:txBody>
+          <a:bodyPr/>
+          <a:lstStyle/>
+          <a:p>
+            <a:r>
+              <a:rPr lang="fr-CH" dirty="0"/>
+              <a:t>3 </a:t>
+            </a:r>
+            <a:r>
+              <a:rPr lang="fr-CH" dirty="0" err="1"/>
+              <a:t>strategies</a:t>
+            </a:r>
+            <a:r>
+              <a:rPr lang="fr-CH" dirty="0"/>
+              <a:t> to </a:t>
+            </a:r>
+            <a:r>
+              <a:rPr lang="fr-CH" dirty="0" err="1"/>
+              <a:t>classify</a:t>
+            </a:r>
+            <a:r>
+              <a:rPr lang="fr-CH" dirty="0"/>
+              <a:t>:</a:t>
+            </a:r>
+          </a:p>
+          <a:p>
             <a:pPr lvl="1"/>
-            <a:endParaRPr lang="en-CH" dirty="0"/>
+            <a:r>
+              <a:rPr lang="fr-CH" dirty="0" err="1"/>
+              <a:t>Number</a:t>
+            </a:r>
+            <a:r>
+              <a:rPr lang="fr-CH" dirty="0"/>
+              <a:t> of contours</a:t>
+            </a:r>
+          </a:p>
+          <a:p>
+            <a:pPr lvl="2"/>
+            <a:r>
+              <a:rPr lang="fr-CH" dirty="0" err="1"/>
+              <a:t>Divided</a:t>
+            </a:r>
+            <a:r>
+              <a:rPr lang="fr-CH" dirty="0"/>
+              <a:t> = 3</a:t>
+            </a:r>
+          </a:p>
+          <a:p>
+            <a:pPr lvl="2"/>
+            <a:r>
+              <a:rPr lang="fr-CH" dirty="0" err="1"/>
+              <a:t>Equal</a:t>
+            </a:r>
+            <a:r>
+              <a:rPr lang="fr-CH" dirty="0"/>
+              <a:t> = 2</a:t>
+            </a:r>
+          </a:p>
+          <a:p>
+            <a:pPr lvl="1"/>
+            <a:r>
+              <a:rPr lang="fr-CH" dirty="0"/>
+              <a:t>Ratio of single contour</a:t>
+            </a:r>
+          </a:p>
+          <a:p>
+            <a:pPr lvl="2"/>
+            <a:r>
+              <a:rPr lang="fr-CH" dirty="0"/>
+              <a:t>Minus &gt; 2</a:t>
+            </a:r>
+          </a:p>
+          <a:p>
+            <a:pPr lvl="1"/>
+            <a:r>
+              <a:rPr lang="fr-CH" dirty="0"/>
+              <a:t>Fourrier </a:t>
+            </a:r>
+            <a:r>
+              <a:rPr lang="fr-CH" dirty="0" err="1"/>
+              <a:t>descriptor</a:t>
+            </a:r>
+            <a:r>
+              <a:rPr lang="fr-CH" dirty="0"/>
+              <a:t> (4th one)</a:t>
+            </a:r>
+          </a:p>
+          <a:p>
+            <a:pPr lvl="2"/>
+            <a:r>
+              <a:rPr lang="fr-CH" dirty="0" err="1"/>
+              <a:t>Multiply</a:t>
+            </a:r>
+            <a:r>
+              <a:rPr lang="fr-CH" dirty="0"/>
+              <a:t> &lt; 0,1</a:t>
+            </a:r>
+          </a:p>
+          <a:p>
+            <a:pPr lvl="2"/>
+            <a:r>
+              <a:rPr lang="fr-CH" dirty="0"/>
+              <a:t>Plus &gt; 0,1</a:t>
+            </a:r>
           </a:p>
         </p:txBody>
       </p:sp>
@@ -5507,93 +5727,6 @@
   <p:clrMapOvr>
     <a:masterClrMapping/>
   </p:clrMapOvr>
-  <p:timing>
-    <p:tnLst>
-      <p:par>
-        <p:cTn id="1" dur="indefinite" restart="never" nodeType="tmRoot">
-          <p:childTnLst>
-            <p:seq concurrent="1" nextAc="seek">
-              <p:cTn id="2" dur="indefinite" nodeType="mainSeq">
-                <p:childTnLst>
-                  <p:par>
-                    <p:cTn id="3" fill="hold">
-                      <p:stCondLst>
-                        <p:cond delay="indefinite"/>
-                      </p:stCondLst>
-                      <p:childTnLst>
-                        <p:par>
-                          <p:cTn id="4" fill="hold">
-                            <p:stCondLst>
-                              <p:cond delay="0"/>
-                            </p:stCondLst>
-                            <p:childTnLst>
-                              <p:par>
-                                <p:cTn id="5" presetID="1" presetClass="entr" presetSubtype="0" fill="hold" grpId="0" nodeType="clickEffect" nodePh="1">
-                                  <p:stCondLst>
-                                    <p:cond delay="0"/>
-                                  </p:stCondLst>
-                                  <p:endCondLst>
-                                    <p:cond evt="begin" delay="0">
-                                      <p:tn val="5"/>
-                                    </p:cond>
-                                  </p:endCondLst>
-                                  <p:childTnLst>
-                                    <p:set>
-                                      <p:cBhvr>
-                                        <p:cTn id="6" dur="1" fill="hold">
-                                          <p:stCondLst>
-                                            <p:cond delay="0"/>
-                                          </p:stCondLst>
-                                        </p:cTn>
-                                        <p:tgtEl>
-                                          <p:spTgt spid="3">
-                                            <p:txEl>
-                                              <p:pRg st="0" end="0"/>
-                                            </p:txEl>
-                                          </p:spTgt>
-                                        </p:tgtEl>
-                                        <p:attrNameLst>
-                                          <p:attrName>style.visibility</p:attrName>
-                                        </p:attrNameLst>
-                                      </p:cBhvr>
-                                      <p:to>
-                                        <p:strVal val="visible"/>
-                                      </p:to>
-                                    </p:set>
-                                  </p:childTnLst>
-                                </p:cTn>
-                              </p:par>
-                            </p:childTnLst>
-                          </p:cTn>
-                        </p:par>
-                      </p:childTnLst>
-                    </p:cTn>
-                  </p:par>
-                </p:childTnLst>
-              </p:cTn>
-              <p:prevCondLst>
-                <p:cond evt="onPrev" delay="0">
-                  <p:tgtEl>
-                    <p:sldTgt/>
-                  </p:tgtEl>
-                </p:cond>
-              </p:prevCondLst>
-              <p:nextCondLst>
-                <p:cond evt="onNext" delay="0">
-                  <p:tgtEl>
-                    <p:sldTgt/>
-                  </p:tgtEl>
-                </p:cond>
-              </p:nextCondLst>
-            </p:seq>
-          </p:childTnLst>
-        </p:cTn>
-      </p:par>
-    </p:tnLst>
-    <p:bldLst>
-      <p:bldP spid="3" grpId="0" uiExpand="1" build="p"/>
-    </p:bldLst>
-  </p:timing>
 </p:sld>
 </file>
 
@@ -5681,29 +5814,158 @@
       </p:sp>
       <p:sp>
         <p:nvSpPr>
-          <p:cNvPr id="3" name="Content Placeholder 2">
-            <a:extLst>
-              <a:ext uri="{FF2B5EF4-FFF2-40B4-BE49-F238E27FC236}">
-                <a16:creationId xmlns:a16="http://schemas.microsoft.com/office/drawing/2014/main" id="{D820A932-C390-4A3A-80DC-003C4B5E693C}"/>
-              </a:ext>
-            </a:extLst>
-          </p:cNvPr>
-          <p:cNvSpPr>
-            <a:spLocks noGrp="1"/>
-          </p:cNvSpPr>
-          <p:nvPr>
-            <p:ph idx="1"/>
-          </p:nvPr>
-        </p:nvSpPr>
-        <p:spPr/>
-        <p:txBody>
-          <a:bodyPr>
-            <a:normAutofit/>
-          </a:bodyPr>
-          <a:lstStyle/>
-          <a:p>
-            <a:pPr lvl="1"/>
-            <a:endParaRPr lang="en-CH" dirty="0"/>
+          <p:cNvPr id="6" name="Espace réservé du texte 5">
+            <a:extLst>
+              <a:ext uri="{FF2B5EF4-FFF2-40B4-BE49-F238E27FC236}">
+                <a16:creationId xmlns:a16="http://schemas.microsoft.com/office/drawing/2014/main" id="{9BABAD20-1829-4504-91AA-AD1C2ECE5850}"/>
+              </a:ext>
+            </a:extLst>
+          </p:cNvPr>
+          <p:cNvSpPr>
+            <a:spLocks noGrp="1"/>
+          </p:cNvSpPr>
+          <p:nvPr>
+            <p:ph type="body" idx="1"/>
+          </p:nvPr>
+        </p:nvSpPr>
+        <p:spPr/>
+        <p:txBody>
+          <a:bodyPr/>
+          <a:lstStyle/>
+          <a:p>
+            <a:r>
+              <a:rPr lang="fr-CH" dirty="0"/>
+              <a:t>Digits</a:t>
+            </a:r>
+            <a:endParaRPr lang="en-US" dirty="0"/>
+          </a:p>
+        </p:txBody>
+      </p:sp>
+      <p:sp>
+        <p:nvSpPr>
+          <p:cNvPr id="7" name="Espace réservé du contenu 6">
+            <a:extLst>
+              <a:ext uri="{FF2B5EF4-FFF2-40B4-BE49-F238E27FC236}">
+                <a16:creationId xmlns:a16="http://schemas.microsoft.com/office/drawing/2014/main" id="{DE75DC7B-C599-4882-9D6D-AA69D5C43FFA}"/>
+              </a:ext>
+            </a:extLst>
+          </p:cNvPr>
+          <p:cNvSpPr>
+            <a:spLocks noGrp="1"/>
+          </p:cNvSpPr>
+          <p:nvPr>
+            <p:ph sz="half" idx="2"/>
+          </p:nvPr>
+        </p:nvSpPr>
+        <p:spPr/>
+        <p:txBody>
+          <a:bodyPr/>
+          <a:lstStyle/>
+          <a:p>
+            <a:r>
+              <a:rPr lang="en-US" dirty="0"/>
+              <a:t>Testing score of 97,65% </a:t>
+            </a:r>
+          </a:p>
+          <a:p>
+            <a:r>
+              <a:rPr lang="en-US"/>
+              <a:t>Some reliability </a:t>
+            </a:r>
+            <a:r>
+              <a:rPr lang="en-US" dirty="0"/>
+              <a:t>issues</a:t>
+            </a:r>
+          </a:p>
+        </p:txBody>
+      </p:sp>
+      <p:sp>
+        <p:nvSpPr>
+          <p:cNvPr id="8" name="Espace réservé du texte 7">
+            <a:extLst>
+              <a:ext uri="{FF2B5EF4-FFF2-40B4-BE49-F238E27FC236}">
+                <a16:creationId xmlns:a16="http://schemas.microsoft.com/office/drawing/2014/main" id="{30DB6E2F-9288-4BB6-8C82-EC6ACF463427}"/>
+              </a:ext>
+            </a:extLst>
+          </p:cNvPr>
+          <p:cNvSpPr>
+            <a:spLocks noGrp="1"/>
+          </p:cNvSpPr>
+          <p:nvPr>
+            <p:ph type="body" sz="quarter" idx="3"/>
+          </p:nvPr>
+        </p:nvSpPr>
+        <p:spPr/>
+        <p:txBody>
+          <a:bodyPr/>
+          <a:lstStyle/>
+          <a:p>
+            <a:r>
+              <a:rPr lang="fr-CH" dirty="0" err="1"/>
+              <a:t>Signs</a:t>
+            </a:r>
+            <a:endParaRPr lang="en-US" dirty="0"/>
+          </a:p>
+        </p:txBody>
+      </p:sp>
+      <p:sp>
+        <p:nvSpPr>
+          <p:cNvPr id="9" name="Espace réservé du contenu 8">
+            <a:extLst>
+              <a:ext uri="{FF2B5EF4-FFF2-40B4-BE49-F238E27FC236}">
+                <a16:creationId xmlns:a16="http://schemas.microsoft.com/office/drawing/2014/main" id="{24DB876D-489F-41A7-9768-978E56CC49C4}"/>
+              </a:ext>
+            </a:extLst>
+          </p:cNvPr>
+          <p:cNvSpPr>
+            <a:spLocks noGrp="1"/>
+          </p:cNvSpPr>
+          <p:nvPr>
+            <p:ph sz="quarter" idx="4"/>
+          </p:nvPr>
+        </p:nvSpPr>
+        <p:spPr/>
+        <p:txBody>
+          <a:bodyPr/>
+          <a:lstStyle/>
+          <a:p>
+            <a:r>
+              <a:rPr lang="fr-CH" dirty="0"/>
+              <a:t>Correct </a:t>
+            </a:r>
+            <a:r>
+              <a:rPr lang="fr-CH" dirty="0" err="1"/>
+              <a:t>detection</a:t>
+            </a:r>
+            <a:r>
+              <a:rPr lang="fr-CH" dirty="0"/>
+              <a:t> of </a:t>
+            </a:r>
+            <a:r>
+              <a:rPr lang="fr-CH" dirty="0" err="1"/>
+              <a:t>signs</a:t>
+            </a:r>
+            <a:r>
+              <a:rPr lang="fr-CH" dirty="0"/>
+              <a:t> on </a:t>
+            </a:r>
+            <a:r>
+              <a:rPr lang="fr-CH" dirty="0" err="1"/>
+              <a:t>small</a:t>
+            </a:r>
+            <a:r>
+              <a:rPr lang="fr-CH" dirty="0"/>
+              <a:t> </a:t>
+            </a:r>
+            <a:r>
+              <a:rPr lang="fr-CH" dirty="0" err="1"/>
+              <a:t>sample</a:t>
+            </a:r>
+            <a:r>
+              <a:rPr lang="fr-CH" dirty="0"/>
+              <a:t> set</a:t>
+            </a:r>
+            <a:endParaRPr lang="en-US" dirty="0"/>
           </a:p>
         </p:txBody>
       </p:sp>
@@ -5774,93 +6036,6 @@
   <p:clrMapOvr>
     <a:masterClrMapping/>
   </p:clrMapOvr>
-  <p:timing>
-    <p:tnLst>
-      <p:par>
-        <p:cTn id="1" dur="indefinite" restart="never" nodeType="tmRoot">
-          <p:childTnLst>
-            <p:seq concurrent="1" nextAc="seek">
-              <p:cTn id="2" dur="indefinite" nodeType="mainSeq">
-                <p:childTnLst>
-                  <p:par>
-                    <p:cTn id="3" fill="hold">
-                      <p:stCondLst>
-                        <p:cond delay="indefinite"/>
-                      </p:stCondLst>
-                      <p:childTnLst>
-                        <p:par>
-                          <p:cTn id="4" fill="hold">
-                            <p:stCondLst>
-                              <p:cond delay="0"/>
-                            </p:stCondLst>
-                            <p:childTnLst>
-                              <p:par>
-                                <p:cTn id="5" presetID="1" presetClass="entr" presetSubtype="0" fill="hold" grpId="0" nodeType="clickEffect" nodePh="1">
-                                  <p:stCondLst>
-                                    <p:cond delay="0"/>
-                                  </p:stCondLst>
-                                  <p:endCondLst>
-                                    <p:cond evt="begin" delay="0">
-                                      <p:tn val="5"/>
-                                    </p:cond>
-                                  </p:endCondLst>
-                                  <p:childTnLst>
-                                    <p:set>
-                                      <p:cBhvr>
-                                        <p:cTn id="6" dur="1" fill="hold">
-                                          <p:stCondLst>
-                                            <p:cond delay="0"/>
-                                          </p:stCondLst>
-                                        </p:cTn>
-                                        <p:tgtEl>
-                                          <p:spTgt spid="3">
-                                            <p:txEl>
-                                              <p:pRg st="0" end="0"/>
-                                            </p:txEl>
-                                          </p:spTgt>
-                                        </p:tgtEl>
-                                        <p:attrNameLst>
-                                          <p:attrName>style.visibility</p:attrName>
-                                        </p:attrNameLst>
-                                      </p:cBhvr>
-                                      <p:to>
-                                        <p:strVal val="visible"/>
-                                      </p:to>
-                                    </p:set>
-                                  </p:childTnLst>
-                                </p:cTn>
-                              </p:par>
-                            </p:childTnLst>
-                          </p:cTn>
-                        </p:par>
-                      </p:childTnLst>
-                    </p:cTn>
-                  </p:par>
-                </p:childTnLst>
-              </p:cTn>
-              <p:prevCondLst>
-                <p:cond evt="onPrev" delay="0">
-                  <p:tgtEl>
-                    <p:sldTgt/>
-                  </p:tgtEl>
-                </p:cond>
-              </p:prevCondLst>
-              <p:nextCondLst>
-                <p:cond evt="onNext" delay="0">
-                  <p:tgtEl>
-                    <p:sldTgt/>
-                  </p:tgtEl>
-                </p:cond>
-              </p:nextCondLst>
-            </p:seq>
-          </p:childTnLst>
-        </p:cTn>
-      </p:par>
-    </p:tnLst>
-    <p:bldLst>
-      <p:bldP spid="3" grpId="0" uiExpand="1" build="p"/>
-    </p:bldLst>
-  </p:timing>
 </p:sld>
 </file>
 

</xml_diff>

<commit_message>
modified: Presentation added segmentation description
</commit_message>
<xml_diff>
--- a/project/presentation.pptx
+++ b/project/presentation.pptx
@@ -4915,6 +4915,250 @@
           <a:lstStyle/>
           <a:p>
             <a:pPr lvl="1"/>
+            <a:r>
+              <a:rPr lang="fr-CH" dirty="0" err="1"/>
+              <a:t>Color</a:t>
+            </a:r>
+            <a:r>
+              <a:rPr lang="fr-CH" dirty="0"/>
+              <a:t> </a:t>
+            </a:r>
+            <a:r>
+              <a:rPr lang="fr-CH" dirty="0" err="1"/>
+              <a:t>channel</a:t>
+            </a:r>
+            <a:r>
+              <a:rPr lang="fr-CH" dirty="0"/>
+              <a:t> </a:t>
+            </a:r>
+            <a:r>
+              <a:rPr lang="fr-CH" dirty="0" err="1"/>
+              <a:t>separations</a:t>
+            </a:r>
+            <a:r>
+              <a:rPr lang="fr-CH" dirty="0"/>
+              <a:t>:</a:t>
+            </a:r>
+          </a:p>
+          <a:p>
+            <a:pPr lvl="2"/>
+            <a:r>
+              <a:rPr lang="fr-CH" dirty="0"/>
+              <a:t>Red to </a:t>
+            </a:r>
+            <a:r>
+              <a:rPr lang="fr-CH" dirty="0" err="1"/>
+              <a:t>track</a:t>
+            </a:r>
+            <a:r>
+              <a:rPr lang="fr-CH" dirty="0"/>
+              <a:t> the </a:t>
+            </a:r>
+            <a:r>
+              <a:rPr lang="fr-CH" dirty="0" err="1"/>
+              <a:t>arrow</a:t>
+            </a:r>
+            <a:r>
+              <a:rPr lang="fr-CH" dirty="0"/>
+              <a:t> (robot)</a:t>
+            </a:r>
+          </a:p>
+          <a:p>
+            <a:pPr lvl="2"/>
+            <a:r>
+              <a:rPr lang="fr-CH" dirty="0"/>
+              <a:t>Blue and Black to </a:t>
+            </a:r>
+            <a:r>
+              <a:rPr lang="fr-CH" dirty="0" err="1"/>
+              <a:t>detect</a:t>
+            </a:r>
+            <a:r>
+              <a:rPr lang="fr-CH" dirty="0"/>
+              <a:t> the digits and </a:t>
+            </a:r>
+            <a:r>
+              <a:rPr lang="fr-CH" dirty="0" err="1"/>
+              <a:t>signs</a:t>
+            </a:r>
+            <a:endParaRPr lang="fr-CH" dirty="0"/>
+          </a:p>
+          <a:p>
+            <a:pPr lvl="1"/>
+            <a:r>
+              <a:rPr lang="fr-CH" dirty="0"/>
+              <a:t>Dilation to </a:t>
+            </a:r>
+            <a:r>
+              <a:rPr lang="fr-CH" dirty="0" err="1"/>
+              <a:t>make</a:t>
+            </a:r>
+            <a:r>
+              <a:rPr lang="fr-CH" dirty="0"/>
+              <a:t> «</a:t>
+            </a:r>
+            <a:r>
+              <a:rPr lang="fr-CH" dirty="0" err="1"/>
+              <a:t>equal</a:t>
+            </a:r>
+            <a:r>
+              <a:rPr lang="fr-CH" dirty="0"/>
+              <a:t>» and «</a:t>
+            </a:r>
+            <a:r>
+              <a:rPr lang="fr-CH" dirty="0" err="1"/>
+              <a:t>divide</a:t>
+            </a:r>
+            <a:r>
+              <a:rPr lang="fr-CH" dirty="0"/>
+              <a:t>» as one </a:t>
+            </a:r>
+            <a:r>
+              <a:rPr lang="fr-CH" dirty="0" err="1"/>
+              <a:t>shape</a:t>
+            </a:r>
+            <a:endParaRPr lang="fr-CH" dirty="0"/>
+          </a:p>
+          <a:p>
+            <a:pPr lvl="1"/>
+            <a:r>
+              <a:rPr lang="fr-CH" dirty="0"/>
+              <a:t>Fit an ellipse </a:t>
+            </a:r>
+            <a:r>
+              <a:rPr lang="fr-CH" dirty="0" err="1"/>
+              <a:t>arround</a:t>
+            </a:r>
+            <a:r>
+              <a:rPr lang="fr-CH" dirty="0"/>
+              <a:t> the contour</a:t>
+            </a:r>
+          </a:p>
+          <a:p>
+            <a:pPr lvl="1"/>
+            <a:r>
+              <a:rPr lang="fr-CH" dirty="0" err="1"/>
+              <a:t>Rotate</a:t>
+            </a:r>
+            <a:r>
+              <a:rPr lang="fr-CH" dirty="0"/>
+              <a:t> the image to </a:t>
+            </a:r>
+            <a:r>
+              <a:rPr lang="fr-CH" dirty="0" err="1"/>
+              <a:t>be</a:t>
+            </a:r>
+            <a:r>
+              <a:rPr lang="fr-CH" dirty="0"/>
+              <a:t> vertical (can </a:t>
+            </a:r>
+            <a:r>
+              <a:rPr lang="fr-CH" dirty="0" err="1"/>
+              <a:t>be</a:t>
+            </a:r>
+            <a:r>
+              <a:rPr lang="fr-CH" dirty="0"/>
+              <a:t> </a:t>
+            </a:r>
+            <a:r>
+              <a:rPr lang="fr-CH" dirty="0" err="1"/>
+              <a:t>rotated</a:t>
+            </a:r>
+            <a:r>
+              <a:rPr lang="fr-CH" dirty="0"/>
+              <a:t> 180°)</a:t>
+            </a:r>
+          </a:p>
+          <a:p>
+            <a:pPr lvl="1"/>
+            <a:r>
+              <a:rPr lang="fr-CH" dirty="0" err="1"/>
+              <a:t>Resize</a:t>
+            </a:r>
+            <a:r>
+              <a:rPr lang="fr-CH" dirty="0"/>
+              <a:t> to 28*28 px</a:t>
+            </a:r>
+          </a:p>
+          <a:p>
+            <a:pPr lvl="1"/>
+            <a:r>
+              <a:rPr lang="fr-CH" dirty="0" err="1"/>
+              <a:t>Threshold</a:t>
+            </a:r>
+            <a:r>
+              <a:rPr lang="fr-CH" dirty="0"/>
+              <a:t> to </a:t>
+            </a:r>
+            <a:r>
+              <a:rPr lang="fr-CH" dirty="0" err="1"/>
+              <a:t>binarize</a:t>
+            </a:r>
+            <a:r>
+              <a:rPr lang="fr-CH" dirty="0"/>
+              <a:t> image (0 and 255)</a:t>
+            </a:r>
+          </a:p>
+          <a:p>
+            <a:pPr lvl="1"/>
+            <a:r>
+              <a:rPr lang="fr-CH" dirty="0"/>
+              <a:t>Save the images </a:t>
+            </a:r>
+            <a:r>
+              <a:rPr lang="fr-CH" dirty="0" err="1"/>
+              <a:t>into</a:t>
+            </a:r>
+            <a:r>
+              <a:rPr lang="fr-CH" dirty="0"/>
+              <a:t> a table </a:t>
+            </a:r>
+            <a:r>
+              <a:rPr lang="fr-CH" dirty="0" err="1"/>
+              <a:t>with</a:t>
+            </a:r>
+            <a:r>
+              <a:rPr lang="fr-CH" dirty="0"/>
+              <a:t> </a:t>
+            </a:r>
+            <a:r>
+              <a:rPr lang="fr-CH" dirty="0" err="1"/>
+              <a:t>their</a:t>
+            </a:r>
+            <a:r>
+              <a:rPr lang="fr-CH" dirty="0"/>
+              <a:t> positions</a:t>
+            </a:r>
+          </a:p>
+          <a:p>
+            <a:pPr lvl="1"/>
+            <a:endParaRPr lang="fr-CH" dirty="0"/>
+          </a:p>
+          <a:p>
+            <a:pPr lvl="1"/>
+            <a:r>
+              <a:rPr lang="fr-CH" dirty="0"/>
+              <a:t>Arrow position: </a:t>
+            </a:r>
+            <a:r>
+              <a:rPr lang="fr-CH" dirty="0" err="1"/>
+              <a:t>centroid</a:t>
+            </a:r>
+            <a:r>
+              <a:rPr lang="fr-CH" dirty="0"/>
+              <a:t> of </a:t>
+            </a:r>
+            <a:r>
+              <a:rPr lang="fr-CH" dirty="0" err="1"/>
+              <a:t>connected</a:t>
+            </a:r>
+            <a:r>
+              <a:rPr lang="fr-CH" dirty="0"/>
+              <a:t> components</a:t>
+            </a:r>
+          </a:p>
+          <a:p>
+            <a:pPr lvl="1"/>
             <a:endParaRPr lang="en-CH" dirty="0"/>
           </a:p>
         </p:txBody>
@@ -5007,15 +5251,10 @@
                             </p:stCondLst>
                             <p:childTnLst>
                               <p:par>
-                                <p:cTn id="5" presetID="1" presetClass="entr" presetSubtype="0" fill="hold" grpId="0" nodeType="clickEffect" nodePh="1">
+                                <p:cTn id="5" presetID="1" presetClass="entr" presetSubtype="0" fill="hold" grpId="0" nodeType="clickEffect">
                                   <p:stCondLst>
                                     <p:cond delay="0"/>
                                   </p:stCondLst>
-                                  <p:endCondLst>
-                                    <p:cond evt="begin" delay="0">
-                                      <p:tn val="5"/>
-                                    </p:cond>
-                                  </p:endCondLst>
                                   <p:childTnLst>
                                     <p:set>
                                       <p:cBhvr>
@@ -5028,6 +5267,285 @@
                                           <p:spTgt spid="3">
                                             <p:txEl>
                                               <p:pRg st="0" end="0"/>
+                                            </p:txEl>
+                                          </p:spTgt>
+                                        </p:tgtEl>
+                                        <p:attrNameLst>
+                                          <p:attrName>style.visibility</p:attrName>
+                                        </p:attrNameLst>
+                                      </p:cBhvr>
+                                      <p:to>
+                                        <p:strVal val="visible"/>
+                                      </p:to>
+                                    </p:set>
+                                  </p:childTnLst>
+                                </p:cTn>
+                              </p:par>
+                              <p:par>
+                                <p:cTn id="7" presetID="1" presetClass="entr" presetSubtype="0" fill="hold" grpId="0" nodeType="withEffect">
+                                  <p:stCondLst>
+                                    <p:cond delay="0"/>
+                                  </p:stCondLst>
+                                  <p:childTnLst>
+                                    <p:set>
+                                      <p:cBhvr>
+                                        <p:cTn id="8" dur="1" fill="hold">
+                                          <p:stCondLst>
+                                            <p:cond delay="0"/>
+                                          </p:stCondLst>
+                                        </p:cTn>
+                                        <p:tgtEl>
+                                          <p:spTgt spid="3">
+                                            <p:txEl>
+                                              <p:pRg st="1" end="1"/>
+                                            </p:txEl>
+                                          </p:spTgt>
+                                        </p:tgtEl>
+                                        <p:attrNameLst>
+                                          <p:attrName>style.visibility</p:attrName>
+                                        </p:attrNameLst>
+                                      </p:cBhvr>
+                                      <p:to>
+                                        <p:strVal val="visible"/>
+                                      </p:to>
+                                    </p:set>
+                                  </p:childTnLst>
+                                </p:cTn>
+                              </p:par>
+                              <p:par>
+                                <p:cTn id="9" presetID="1" presetClass="entr" presetSubtype="0" fill="hold" grpId="0" nodeType="withEffect">
+                                  <p:stCondLst>
+                                    <p:cond delay="0"/>
+                                  </p:stCondLst>
+                                  <p:childTnLst>
+                                    <p:set>
+                                      <p:cBhvr>
+                                        <p:cTn id="10" dur="1" fill="hold">
+                                          <p:stCondLst>
+                                            <p:cond delay="0"/>
+                                          </p:stCondLst>
+                                        </p:cTn>
+                                        <p:tgtEl>
+                                          <p:spTgt spid="3">
+                                            <p:txEl>
+                                              <p:pRg st="2" end="2"/>
+                                            </p:txEl>
+                                          </p:spTgt>
+                                        </p:tgtEl>
+                                        <p:attrNameLst>
+                                          <p:attrName>style.visibility</p:attrName>
+                                        </p:attrNameLst>
+                                      </p:cBhvr>
+                                      <p:to>
+                                        <p:strVal val="visible"/>
+                                      </p:to>
+                                    </p:set>
+                                  </p:childTnLst>
+                                </p:cTn>
+                              </p:par>
+                              <p:par>
+                                <p:cTn id="11" presetID="1" presetClass="entr" presetSubtype="0" fill="hold" grpId="0" nodeType="withEffect">
+                                  <p:stCondLst>
+                                    <p:cond delay="0"/>
+                                  </p:stCondLst>
+                                  <p:childTnLst>
+                                    <p:set>
+                                      <p:cBhvr>
+                                        <p:cTn id="12" dur="1" fill="hold">
+                                          <p:stCondLst>
+                                            <p:cond delay="0"/>
+                                          </p:stCondLst>
+                                        </p:cTn>
+                                        <p:tgtEl>
+                                          <p:spTgt spid="3">
+                                            <p:txEl>
+                                              <p:pRg st="3" end="3"/>
+                                            </p:txEl>
+                                          </p:spTgt>
+                                        </p:tgtEl>
+                                        <p:attrNameLst>
+                                          <p:attrName>style.visibility</p:attrName>
+                                        </p:attrNameLst>
+                                      </p:cBhvr>
+                                      <p:to>
+                                        <p:strVal val="visible"/>
+                                      </p:to>
+                                    </p:set>
+                                  </p:childTnLst>
+                                </p:cTn>
+                              </p:par>
+                              <p:par>
+                                <p:cTn id="13" presetID="1" presetClass="entr" presetSubtype="0" fill="hold" grpId="0" nodeType="withEffect">
+                                  <p:stCondLst>
+                                    <p:cond delay="0"/>
+                                  </p:stCondLst>
+                                  <p:childTnLst>
+                                    <p:set>
+                                      <p:cBhvr>
+                                        <p:cTn id="14" dur="1" fill="hold">
+                                          <p:stCondLst>
+                                            <p:cond delay="0"/>
+                                          </p:stCondLst>
+                                        </p:cTn>
+                                        <p:tgtEl>
+                                          <p:spTgt spid="3">
+                                            <p:txEl>
+                                              <p:pRg st="4" end="4"/>
+                                            </p:txEl>
+                                          </p:spTgt>
+                                        </p:tgtEl>
+                                        <p:attrNameLst>
+                                          <p:attrName>style.visibility</p:attrName>
+                                        </p:attrNameLst>
+                                      </p:cBhvr>
+                                      <p:to>
+                                        <p:strVal val="visible"/>
+                                      </p:to>
+                                    </p:set>
+                                  </p:childTnLst>
+                                </p:cTn>
+                              </p:par>
+                              <p:par>
+                                <p:cTn id="15" presetID="1" presetClass="entr" presetSubtype="0" fill="hold" grpId="0" nodeType="withEffect">
+                                  <p:stCondLst>
+                                    <p:cond delay="0"/>
+                                  </p:stCondLst>
+                                  <p:childTnLst>
+                                    <p:set>
+                                      <p:cBhvr>
+                                        <p:cTn id="16" dur="1" fill="hold">
+                                          <p:stCondLst>
+                                            <p:cond delay="0"/>
+                                          </p:stCondLst>
+                                        </p:cTn>
+                                        <p:tgtEl>
+                                          <p:spTgt spid="3">
+                                            <p:txEl>
+                                              <p:pRg st="5" end="5"/>
+                                            </p:txEl>
+                                          </p:spTgt>
+                                        </p:tgtEl>
+                                        <p:attrNameLst>
+                                          <p:attrName>style.visibility</p:attrName>
+                                        </p:attrNameLst>
+                                      </p:cBhvr>
+                                      <p:to>
+                                        <p:strVal val="visible"/>
+                                      </p:to>
+                                    </p:set>
+                                  </p:childTnLst>
+                                </p:cTn>
+                              </p:par>
+                              <p:par>
+                                <p:cTn id="17" presetID="1" presetClass="entr" presetSubtype="0" fill="hold" grpId="0" nodeType="withEffect">
+                                  <p:stCondLst>
+                                    <p:cond delay="0"/>
+                                  </p:stCondLst>
+                                  <p:childTnLst>
+                                    <p:set>
+                                      <p:cBhvr>
+                                        <p:cTn id="18" dur="1" fill="hold">
+                                          <p:stCondLst>
+                                            <p:cond delay="0"/>
+                                          </p:stCondLst>
+                                        </p:cTn>
+                                        <p:tgtEl>
+                                          <p:spTgt spid="3">
+                                            <p:txEl>
+                                              <p:pRg st="6" end="6"/>
+                                            </p:txEl>
+                                          </p:spTgt>
+                                        </p:tgtEl>
+                                        <p:attrNameLst>
+                                          <p:attrName>style.visibility</p:attrName>
+                                        </p:attrNameLst>
+                                      </p:cBhvr>
+                                      <p:to>
+                                        <p:strVal val="visible"/>
+                                      </p:to>
+                                    </p:set>
+                                  </p:childTnLst>
+                                </p:cTn>
+                              </p:par>
+                              <p:par>
+                                <p:cTn id="19" presetID="1" presetClass="entr" presetSubtype="0" fill="hold" grpId="0" nodeType="withEffect">
+                                  <p:stCondLst>
+                                    <p:cond delay="0"/>
+                                  </p:stCondLst>
+                                  <p:childTnLst>
+                                    <p:set>
+                                      <p:cBhvr>
+                                        <p:cTn id="20" dur="1" fill="hold">
+                                          <p:stCondLst>
+                                            <p:cond delay="0"/>
+                                          </p:stCondLst>
+                                        </p:cTn>
+                                        <p:tgtEl>
+                                          <p:spTgt spid="3">
+                                            <p:txEl>
+                                              <p:pRg st="7" end="7"/>
+                                            </p:txEl>
+                                          </p:spTgt>
+                                        </p:tgtEl>
+                                        <p:attrNameLst>
+                                          <p:attrName>style.visibility</p:attrName>
+                                        </p:attrNameLst>
+                                      </p:cBhvr>
+                                      <p:to>
+                                        <p:strVal val="visible"/>
+                                      </p:to>
+                                    </p:set>
+                                  </p:childTnLst>
+                                </p:cTn>
+                              </p:par>
+                              <p:par>
+                                <p:cTn id="21" presetID="1" presetClass="entr" presetSubtype="0" fill="hold" grpId="0" nodeType="withEffect">
+                                  <p:stCondLst>
+                                    <p:cond delay="0"/>
+                                  </p:stCondLst>
+                                  <p:childTnLst>
+                                    <p:set>
+                                      <p:cBhvr>
+                                        <p:cTn id="22" dur="1" fill="hold">
+                                          <p:stCondLst>
+                                            <p:cond delay="0"/>
+                                          </p:stCondLst>
+                                        </p:cTn>
+                                        <p:tgtEl>
+                                          <p:spTgt spid="3">
+                                            <p:txEl>
+                                              <p:pRg st="8" end="8"/>
+                                            </p:txEl>
+                                          </p:spTgt>
+                                        </p:tgtEl>
+                                        <p:attrNameLst>
+                                          <p:attrName>style.visibility</p:attrName>
+                                        </p:attrNameLst>
+                                      </p:cBhvr>
+                                      <p:to>
+                                        <p:strVal val="visible"/>
+                                      </p:to>
+                                    </p:set>
+                                  </p:childTnLst>
+                                </p:cTn>
+                              </p:par>
+                              <p:par>
+                                <p:cTn id="23" presetID="1" presetClass="entr" presetSubtype="0" fill="hold" grpId="0" nodeType="withEffect">
+                                  <p:stCondLst>
+                                    <p:cond delay="0"/>
+                                  </p:stCondLst>
+                                  <p:childTnLst>
+                                    <p:set>
+                                      <p:cBhvr>
+                                        <p:cTn id="24" dur="1" fill="hold">
+                                          <p:stCondLst>
+                                            <p:cond delay="0"/>
+                                          </p:stCondLst>
+                                        </p:cTn>
+                                        <p:tgtEl>
+                                          <p:spTgt spid="3">
+                                            <p:txEl>
+                                              <p:pRg st="10" end="10"/>
                                             </p:txEl>
                                           </p:spTgt>
                                         </p:tgtEl>
@@ -5166,6 +5684,74 @@
           <a:lstStyle/>
           <a:p>
             <a:pPr lvl="1"/>
+            <a:r>
+              <a:rPr lang="fr-CH" dirty="0"/>
+              <a:t>Arrow </a:t>
+            </a:r>
+            <a:r>
+              <a:rPr lang="fr-CH" dirty="0" err="1"/>
+              <a:t>tracked</a:t>
+            </a:r>
+            <a:r>
+              <a:rPr lang="fr-CH" dirty="0"/>
+              <a:t> </a:t>
+            </a:r>
+            <a:r>
+              <a:rPr lang="fr-CH" dirty="0" err="1"/>
+              <a:t>during</a:t>
+            </a:r>
+            <a:r>
+              <a:rPr lang="fr-CH" dirty="0"/>
+              <a:t> the </a:t>
+            </a:r>
+            <a:r>
+              <a:rPr lang="fr-CH" dirty="0" err="1"/>
+              <a:t>whole</a:t>
+            </a:r>
+            <a:r>
+              <a:rPr lang="fr-CH" dirty="0"/>
+              <a:t> </a:t>
+            </a:r>
+            <a:r>
+              <a:rPr lang="fr-CH" dirty="0" err="1"/>
+              <a:t>video</a:t>
+            </a:r>
+            <a:endParaRPr lang="fr-CH" dirty="0"/>
+          </a:p>
+          <a:p>
+            <a:pPr lvl="1"/>
+            <a:r>
+              <a:rPr lang="fr-CH" dirty="0" err="1"/>
+              <a:t>Signs</a:t>
+            </a:r>
+            <a:r>
+              <a:rPr lang="fr-CH" dirty="0"/>
+              <a:t> and digits </a:t>
+            </a:r>
+            <a:r>
+              <a:rPr lang="fr-CH" dirty="0" err="1"/>
+              <a:t>extracted</a:t>
+            </a:r>
+            <a:r>
+              <a:rPr lang="fr-CH" dirty="0"/>
+              <a:t> and </a:t>
+            </a:r>
+            <a:r>
+              <a:rPr lang="fr-CH" dirty="0" err="1"/>
+              <a:t>rotated</a:t>
+            </a:r>
+            <a:r>
+              <a:rPr lang="fr-CH" dirty="0"/>
+              <a:t> </a:t>
+            </a:r>
+            <a:r>
+              <a:rPr lang="fr-CH" dirty="0" err="1"/>
+              <a:t>correctly</a:t>
+            </a:r>
+            <a:endParaRPr lang="fr-CH" dirty="0"/>
+          </a:p>
+          <a:p>
+            <a:pPr lvl="1"/>
             <a:endParaRPr lang="en-CH" dirty="0"/>
           </a:p>
         </p:txBody>
@@ -5258,15 +5844,10 @@
                             </p:stCondLst>
                             <p:childTnLst>
                               <p:par>
-                                <p:cTn id="5" presetID="1" presetClass="entr" presetSubtype="0" fill="hold" grpId="0" nodeType="clickEffect" nodePh="1">
+                                <p:cTn id="5" presetID="1" presetClass="entr" presetSubtype="0" fill="hold" grpId="0" nodeType="clickEffect">
                                   <p:stCondLst>
                                     <p:cond delay="0"/>
                                   </p:stCondLst>
-                                  <p:endCondLst>
-                                    <p:cond evt="begin" delay="0">
-                                      <p:tn val="5"/>
-                                    </p:cond>
-                                  </p:endCondLst>
                                   <p:childTnLst>
                                     <p:set>
                                       <p:cBhvr>
@@ -5279,6 +5860,37 @@
                                           <p:spTgt spid="3">
                                             <p:txEl>
                                               <p:pRg st="0" end="0"/>
+                                            </p:txEl>
+                                          </p:spTgt>
+                                        </p:tgtEl>
+                                        <p:attrNameLst>
+                                          <p:attrName>style.visibility</p:attrName>
+                                        </p:attrNameLst>
+                                      </p:cBhvr>
+                                      <p:to>
+                                        <p:strVal val="visible"/>
+                                      </p:to>
+                                    </p:set>
+                                  </p:childTnLst>
+                                </p:cTn>
+                              </p:par>
+                              <p:par>
+                                <p:cTn id="7" presetID="1" presetClass="entr" presetSubtype="0" fill="hold" grpId="0" nodeType="withEffect">
+                                  <p:stCondLst>
+                                    <p:cond delay="0"/>
+                                  </p:stCondLst>
+                                  <p:childTnLst>
+                                    <p:set>
+                                      <p:cBhvr>
+                                        <p:cTn id="8" dur="1" fill="hold">
+                                          <p:stCondLst>
+                                            <p:cond delay="0"/>
+                                          </p:stCondLst>
+                                        </p:cTn>
+                                        <p:tgtEl>
+                                          <p:spTgt spid="3">
+                                            <p:txEl>
+                                              <p:pRg st="1" end="1"/>
                                             </p:txEl>
                                           </p:spTgt>
                                         </p:tgtEl>
@@ -5727,6 +6339,447 @@
   <p:clrMapOvr>
     <a:masterClrMapping/>
   </p:clrMapOvr>
+  <p:timing>
+    <p:tnLst>
+      <p:par>
+        <p:cTn id="1" dur="indefinite" restart="never" nodeType="tmRoot">
+          <p:childTnLst>
+            <p:seq concurrent="1" nextAc="seek">
+              <p:cTn id="2" dur="indefinite" nodeType="mainSeq">
+                <p:childTnLst>
+                  <p:par>
+                    <p:cTn id="3" fill="hold">
+                      <p:stCondLst>
+                        <p:cond delay="indefinite"/>
+                      </p:stCondLst>
+                      <p:childTnLst>
+                        <p:par>
+                          <p:cTn id="4" fill="hold">
+                            <p:stCondLst>
+                              <p:cond delay="0"/>
+                            </p:stCondLst>
+                            <p:childTnLst>
+                              <p:par>
+                                <p:cTn id="5" presetID="1" presetClass="entr" presetSubtype="0" fill="hold" nodeType="clickEffect">
+                                  <p:stCondLst>
+                                    <p:cond delay="0"/>
+                                  </p:stCondLst>
+                                  <p:childTnLst>
+                                    <p:set>
+                                      <p:cBhvr>
+                                        <p:cTn id="6" dur="1" fill="hold">
+                                          <p:stCondLst>
+                                            <p:cond delay="0"/>
+                                          </p:stCondLst>
+                                        </p:cTn>
+                                        <p:tgtEl>
+                                          <p:spTgt spid="7">
+                                            <p:txEl>
+                                              <p:pRg st="0" end="0"/>
+                                            </p:txEl>
+                                          </p:spTgt>
+                                        </p:tgtEl>
+                                        <p:attrNameLst>
+                                          <p:attrName>style.visibility</p:attrName>
+                                        </p:attrNameLst>
+                                      </p:cBhvr>
+                                      <p:to>
+                                        <p:strVal val="visible"/>
+                                      </p:to>
+                                    </p:set>
+                                  </p:childTnLst>
+                                </p:cTn>
+                              </p:par>
+                              <p:par>
+                                <p:cTn id="7" presetID="1" presetClass="entr" presetSubtype="0" fill="hold" nodeType="withEffect">
+                                  <p:stCondLst>
+                                    <p:cond delay="0"/>
+                                  </p:stCondLst>
+                                  <p:childTnLst>
+                                    <p:set>
+                                      <p:cBhvr>
+                                        <p:cTn id="8" dur="1" fill="hold">
+                                          <p:stCondLst>
+                                            <p:cond delay="0"/>
+                                          </p:stCondLst>
+                                        </p:cTn>
+                                        <p:tgtEl>
+                                          <p:spTgt spid="7">
+                                            <p:txEl>
+                                              <p:pRg st="1" end="1"/>
+                                            </p:txEl>
+                                          </p:spTgt>
+                                        </p:tgtEl>
+                                        <p:attrNameLst>
+                                          <p:attrName>style.visibility</p:attrName>
+                                        </p:attrNameLst>
+                                      </p:cBhvr>
+                                      <p:to>
+                                        <p:strVal val="visible"/>
+                                      </p:to>
+                                    </p:set>
+                                  </p:childTnLst>
+                                </p:cTn>
+                              </p:par>
+                              <p:par>
+                                <p:cTn id="9" presetID="1" presetClass="entr" presetSubtype="0" fill="hold" nodeType="withEffect">
+                                  <p:stCondLst>
+                                    <p:cond delay="0"/>
+                                  </p:stCondLst>
+                                  <p:childTnLst>
+                                    <p:set>
+                                      <p:cBhvr>
+                                        <p:cTn id="10" dur="1" fill="hold">
+                                          <p:stCondLst>
+                                            <p:cond delay="0"/>
+                                          </p:stCondLst>
+                                        </p:cTn>
+                                        <p:tgtEl>
+                                          <p:spTgt spid="7">
+                                            <p:txEl>
+                                              <p:pRg st="2" end="2"/>
+                                            </p:txEl>
+                                          </p:spTgt>
+                                        </p:tgtEl>
+                                        <p:attrNameLst>
+                                          <p:attrName>style.visibility</p:attrName>
+                                        </p:attrNameLst>
+                                      </p:cBhvr>
+                                      <p:to>
+                                        <p:strVal val="visible"/>
+                                      </p:to>
+                                    </p:set>
+                                  </p:childTnLst>
+                                </p:cTn>
+                              </p:par>
+                            </p:childTnLst>
+                          </p:cTn>
+                        </p:par>
+                      </p:childTnLst>
+                    </p:cTn>
+                  </p:par>
+                  <p:par>
+                    <p:cTn id="11" fill="hold">
+                      <p:stCondLst>
+                        <p:cond delay="indefinite"/>
+                      </p:stCondLst>
+                      <p:childTnLst>
+                        <p:par>
+                          <p:cTn id="12" fill="hold">
+                            <p:stCondLst>
+                              <p:cond delay="0"/>
+                            </p:stCondLst>
+                            <p:childTnLst>
+                              <p:par>
+                                <p:cTn id="13" presetID="1" presetClass="entr" presetSubtype="0" fill="hold" grpId="0" nodeType="clickEffect">
+                                  <p:stCondLst>
+                                    <p:cond delay="0"/>
+                                  </p:stCondLst>
+                                  <p:childTnLst>
+                                    <p:set>
+                                      <p:cBhvr>
+                                        <p:cTn id="14" dur="1" fill="hold">
+                                          <p:stCondLst>
+                                            <p:cond delay="0"/>
+                                          </p:stCondLst>
+                                        </p:cTn>
+                                        <p:tgtEl>
+                                          <p:spTgt spid="9">
+                                            <p:txEl>
+                                              <p:pRg st="0" end="0"/>
+                                            </p:txEl>
+                                          </p:spTgt>
+                                        </p:tgtEl>
+                                        <p:attrNameLst>
+                                          <p:attrName>style.visibility</p:attrName>
+                                        </p:attrNameLst>
+                                      </p:cBhvr>
+                                      <p:to>
+                                        <p:strVal val="visible"/>
+                                      </p:to>
+                                    </p:set>
+                                  </p:childTnLst>
+                                </p:cTn>
+                              </p:par>
+                              <p:par>
+                                <p:cTn id="15" presetID="1" presetClass="entr" presetSubtype="0" fill="hold" grpId="0" nodeType="withEffect">
+                                  <p:stCondLst>
+                                    <p:cond delay="0"/>
+                                  </p:stCondLst>
+                                  <p:childTnLst>
+                                    <p:set>
+                                      <p:cBhvr>
+                                        <p:cTn id="16" dur="1" fill="hold">
+                                          <p:stCondLst>
+                                            <p:cond delay="0"/>
+                                          </p:stCondLst>
+                                        </p:cTn>
+                                        <p:tgtEl>
+                                          <p:spTgt spid="9">
+                                            <p:txEl>
+                                              <p:pRg st="1" end="1"/>
+                                            </p:txEl>
+                                          </p:spTgt>
+                                        </p:tgtEl>
+                                        <p:attrNameLst>
+                                          <p:attrName>style.visibility</p:attrName>
+                                        </p:attrNameLst>
+                                      </p:cBhvr>
+                                      <p:to>
+                                        <p:strVal val="visible"/>
+                                      </p:to>
+                                    </p:set>
+                                  </p:childTnLst>
+                                </p:cTn>
+                              </p:par>
+                              <p:par>
+                                <p:cTn id="17" presetID="1" presetClass="entr" presetSubtype="0" fill="hold" grpId="0" nodeType="withEffect">
+                                  <p:stCondLst>
+                                    <p:cond delay="0"/>
+                                  </p:stCondLst>
+                                  <p:childTnLst>
+                                    <p:set>
+                                      <p:cBhvr>
+                                        <p:cTn id="18" dur="1" fill="hold">
+                                          <p:stCondLst>
+                                            <p:cond delay="0"/>
+                                          </p:stCondLst>
+                                        </p:cTn>
+                                        <p:tgtEl>
+                                          <p:spTgt spid="9">
+                                            <p:txEl>
+                                              <p:pRg st="2" end="2"/>
+                                            </p:txEl>
+                                          </p:spTgt>
+                                        </p:tgtEl>
+                                        <p:attrNameLst>
+                                          <p:attrName>style.visibility</p:attrName>
+                                        </p:attrNameLst>
+                                      </p:cBhvr>
+                                      <p:to>
+                                        <p:strVal val="visible"/>
+                                      </p:to>
+                                    </p:set>
+                                  </p:childTnLst>
+                                </p:cTn>
+                              </p:par>
+                              <p:par>
+                                <p:cTn id="19" presetID="1" presetClass="entr" presetSubtype="0" fill="hold" grpId="0" nodeType="withEffect">
+                                  <p:stCondLst>
+                                    <p:cond delay="0"/>
+                                  </p:stCondLst>
+                                  <p:childTnLst>
+                                    <p:set>
+                                      <p:cBhvr>
+                                        <p:cTn id="20" dur="1" fill="hold">
+                                          <p:stCondLst>
+                                            <p:cond delay="0"/>
+                                          </p:stCondLst>
+                                        </p:cTn>
+                                        <p:tgtEl>
+                                          <p:spTgt spid="9">
+                                            <p:txEl>
+                                              <p:pRg st="3" end="3"/>
+                                            </p:txEl>
+                                          </p:spTgt>
+                                        </p:tgtEl>
+                                        <p:attrNameLst>
+                                          <p:attrName>style.visibility</p:attrName>
+                                        </p:attrNameLst>
+                                      </p:cBhvr>
+                                      <p:to>
+                                        <p:strVal val="visible"/>
+                                      </p:to>
+                                    </p:set>
+                                  </p:childTnLst>
+                                </p:cTn>
+                              </p:par>
+                              <p:par>
+                                <p:cTn id="21" presetID="1" presetClass="entr" presetSubtype="0" fill="hold" grpId="0" nodeType="withEffect">
+                                  <p:stCondLst>
+                                    <p:cond delay="0"/>
+                                  </p:stCondLst>
+                                  <p:childTnLst>
+                                    <p:set>
+                                      <p:cBhvr>
+                                        <p:cTn id="22" dur="1" fill="hold">
+                                          <p:stCondLst>
+                                            <p:cond delay="0"/>
+                                          </p:stCondLst>
+                                        </p:cTn>
+                                        <p:tgtEl>
+                                          <p:spTgt spid="9">
+                                            <p:txEl>
+                                              <p:pRg st="4" end="4"/>
+                                            </p:txEl>
+                                          </p:spTgt>
+                                        </p:tgtEl>
+                                        <p:attrNameLst>
+                                          <p:attrName>style.visibility</p:attrName>
+                                        </p:attrNameLst>
+                                      </p:cBhvr>
+                                      <p:to>
+                                        <p:strVal val="visible"/>
+                                      </p:to>
+                                    </p:set>
+                                  </p:childTnLst>
+                                </p:cTn>
+                              </p:par>
+                              <p:par>
+                                <p:cTn id="23" presetID="1" presetClass="entr" presetSubtype="0" fill="hold" grpId="0" nodeType="withEffect">
+                                  <p:stCondLst>
+                                    <p:cond delay="0"/>
+                                  </p:stCondLst>
+                                  <p:childTnLst>
+                                    <p:set>
+                                      <p:cBhvr>
+                                        <p:cTn id="24" dur="1" fill="hold">
+                                          <p:stCondLst>
+                                            <p:cond delay="0"/>
+                                          </p:stCondLst>
+                                        </p:cTn>
+                                        <p:tgtEl>
+                                          <p:spTgt spid="9">
+                                            <p:txEl>
+                                              <p:pRg st="5" end="5"/>
+                                            </p:txEl>
+                                          </p:spTgt>
+                                        </p:tgtEl>
+                                        <p:attrNameLst>
+                                          <p:attrName>style.visibility</p:attrName>
+                                        </p:attrNameLst>
+                                      </p:cBhvr>
+                                      <p:to>
+                                        <p:strVal val="visible"/>
+                                      </p:to>
+                                    </p:set>
+                                  </p:childTnLst>
+                                </p:cTn>
+                              </p:par>
+                              <p:par>
+                                <p:cTn id="25" presetID="1" presetClass="entr" presetSubtype="0" fill="hold" grpId="0" nodeType="withEffect">
+                                  <p:stCondLst>
+                                    <p:cond delay="0"/>
+                                  </p:stCondLst>
+                                  <p:childTnLst>
+                                    <p:set>
+                                      <p:cBhvr>
+                                        <p:cTn id="26" dur="1" fill="hold">
+                                          <p:stCondLst>
+                                            <p:cond delay="0"/>
+                                          </p:stCondLst>
+                                        </p:cTn>
+                                        <p:tgtEl>
+                                          <p:spTgt spid="9">
+                                            <p:txEl>
+                                              <p:pRg st="6" end="6"/>
+                                            </p:txEl>
+                                          </p:spTgt>
+                                        </p:tgtEl>
+                                        <p:attrNameLst>
+                                          <p:attrName>style.visibility</p:attrName>
+                                        </p:attrNameLst>
+                                      </p:cBhvr>
+                                      <p:to>
+                                        <p:strVal val="visible"/>
+                                      </p:to>
+                                    </p:set>
+                                  </p:childTnLst>
+                                </p:cTn>
+                              </p:par>
+                              <p:par>
+                                <p:cTn id="27" presetID="1" presetClass="entr" presetSubtype="0" fill="hold" grpId="0" nodeType="withEffect">
+                                  <p:stCondLst>
+                                    <p:cond delay="0"/>
+                                  </p:stCondLst>
+                                  <p:childTnLst>
+                                    <p:set>
+                                      <p:cBhvr>
+                                        <p:cTn id="28" dur="1" fill="hold">
+                                          <p:stCondLst>
+                                            <p:cond delay="0"/>
+                                          </p:stCondLst>
+                                        </p:cTn>
+                                        <p:tgtEl>
+                                          <p:spTgt spid="9">
+                                            <p:txEl>
+                                              <p:pRg st="7" end="7"/>
+                                            </p:txEl>
+                                          </p:spTgt>
+                                        </p:tgtEl>
+                                        <p:attrNameLst>
+                                          <p:attrName>style.visibility</p:attrName>
+                                        </p:attrNameLst>
+                                      </p:cBhvr>
+                                      <p:to>
+                                        <p:strVal val="visible"/>
+                                      </p:to>
+                                    </p:set>
+                                  </p:childTnLst>
+                                </p:cTn>
+                              </p:par>
+                              <p:par>
+                                <p:cTn id="29" presetID="1" presetClass="entr" presetSubtype="0" fill="hold" grpId="0" nodeType="withEffect">
+                                  <p:stCondLst>
+                                    <p:cond delay="0"/>
+                                  </p:stCondLst>
+                                  <p:childTnLst>
+                                    <p:set>
+                                      <p:cBhvr>
+                                        <p:cTn id="30" dur="1" fill="hold">
+                                          <p:stCondLst>
+                                            <p:cond delay="0"/>
+                                          </p:stCondLst>
+                                        </p:cTn>
+                                        <p:tgtEl>
+                                          <p:spTgt spid="9">
+                                            <p:txEl>
+                                              <p:pRg st="8" end="8"/>
+                                            </p:txEl>
+                                          </p:spTgt>
+                                        </p:tgtEl>
+                                        <p:attrNameLst>
+                                          <p:attrName>style.visibility</p:attrName>
+                                        </p:attrNameLst>
+                                      </p:cBhvr>
+                                      <p:to>
+                                        <p:strVal val="visible"/>
+                                      </p:to>
+                                    </p:set>
+                                  </p:childTnLst>
+                                </p:cTn>
+                              </p:par>
+                            </p:childTnLst>
+                          </p:cTn>
+                        </p:par>
+                      </p:childTnLst>
+                    </p:cTn>
+                  </p:par>
+                </p:childTnLst>
+              </p:cTn>
+              <p:prevCondLst>
+                <p:cond evt="onPrev" delay="0">
+                  <p:tgtEl>
+                    <p:sldTgt/>
+                  </p:tgtEl>
+                </p:cond>
+              </p:prevCondLst>
+              <p:nextCondLst>
+                <p:cond evt="onNext" delay="0">
+                  <p:tgtEl>
+                    <p:sldTgt/>
+                  </p:tgtEl>
+                </p:cond>
+              </p:nextCondLst>
+            </p:seq>
+          </p:childTnLst>
+        </p:cTn>
+      </p:par>
+    </p:tnLst>
+    <p:bldLst>
+      <p:bldP spid="9" grpId="0" build="p"/>
+    </p:bldLst>
+  </p:timing>
 </p:sld>
 </file>
 
@@ -5869,12 +6922,8 @@
           </a:p>
           <a:p>
             <a:r>
-              <a:rPr lang="en-US"/>
-              <a:t>Some reliability </a:t>
-            </a:r>
-            <a:r>
               <a:rPr lang="en-US" dirty="0"/>
-              <a:t>issues</a:t>
+              <a:t>Some reliability issues</a:t>
             </a:r>
           </a:p>
         </p:txBody>
@@ -6036,6 +7085,165 @@
   <p:clrMapOvr>
     <a:masterClrMapping/>
   </p:clrMapOvr>
+  <p:timing>
+    <p:tnLst>
+      <p:par>
+        <p:cTn id="1" dur="indefinite" restart="never" nodeType="tmRoot">
+          <p:childTnLst>
+            <p:seq concurrent="1" nextAc="seek">
+              <p:cTn id="2" dur="indefinite" nodeType="mainSeq">
+                <p:childTnLst>
+                  <p:par>
+                    <p:cTn id="3" fill="hold">
+                      <p:stCondLst>
+                        <p:cond delay="indefinite"/>
+                      </p:stCondLst>
+                      <p:childTnLst>
+                        <p:par>
+                          <p:cTn id="4" fill="hold">
+                            <p:stCondLst>
+                              <p:cond delay="0"/>
+                            </p:stCondLst>
+                            <p:childTnLst>
+                              <p:par>
+                                <p:cTn id="5" presetID="1" presetClass="entr" presetSubtype="0" fill="hold" nodeType="clickEffect">
+                                  <p:stCondLst>
+                                    <p:cond delay="0"/>
+                                  </p:stCondLst>
+                                  <p:childTnLst>
+                                    <p:set>
+                                      <p:cBhvr>
+                                        <p:cTn id="6" dur="1" fill="hold">
+                                          <p:stCondLst>
+                                            <p:cond delay="0"/>
+                                          </p:stCondLst>
+                                        </p:cTn>
+                                        <p:tgtEl>
+                                          <p:spTgt spid="7">
+                                            <p:txEl>
+                                              <p:pRg st="0" end="0"/>
+                                            </p:txEl>
+                                          </p:spTgt>
+                                        </p:tgtEl>
+                                        <p:attrNameLst>
+                                          <p:attrName>style.visibility</p:attrName>
+                                        </p:attrNameLst>
+                                      </p:cBhvr>
+                                      <p:to>
+                                        <p:strVal val="visible"/>
+                                      </p:to>
+                                    </p:set>
+                                  </p:childTnLst>
+                                </p:cTn>
+                              </p:par>
+                              <p:par>
+                                <p:cTn id="7" presetID="1" presetClass="entr" presetSubtype="0" fill="hold" nodeType="withEffect">
+                                  <p:stCondLst>
+                                    <p:cond delay="0"/>
+                                  </p:stCondLst>
+                                  <p:childTnLst>
+                                    <p:set>
+                                      <p:cBhvr>
+                                        <p:cTn id="8" dur="1" fill="hold">
+                                          <p:stCondLst>
+                                            <p:cond delay="0"/>
+                                          </p:stCondLst>
+                                        </p:cTn>
+                                        <p:tgtEl>
+                                          <p:spTgt spid="7">
+                                            <p:txEl>
+                                              <p:pRg st="1" end="1"/>
+                                            </p:txEl>
+                                          </p:spTgt>
+                                        </p:tgtEl>
+                                        <p:attrNameLst>
+                                          <p:attrName>style.visibility</p:attrName>
+                                        </p:attrNameLst>
+                                      </p:cBhvr>
+                                      <p:to>
+                                        <p:strVal val="visible"/>
+                                      </p:to>
+                                    </p:set>
+                                  </p:childTnLst>
+                                </p:cTn>
+                              </p:par>
+                            </p:childTnLst>
+                          </p:cTn>
+                        </p:par>
+                      </p:childTnLst>
+                    </p:cTn>
+                  </p:par>
+                  <p:par>
+                    <p:cTn id="9" fill="hold">
+                      <p:stCondLst>
+                        <p:cond delay="indefinite"/>
+                      </p:stCondLst>
+                      <p:childTnLst>
+                        <p:par>
+                          <p:cTn id="10" fill="hold">
+                            <p:stCondLst>
+                              <p:cond delay="0"/>
+                            </p:stCondLst>
+                            <p:childTnLst>
+                              <p:par>
+                                <p:cTn id="11" presetID="1" presetClass="entr" presetSubtype="0" fill="hold" nodeType="clickEffect">
+                                  <p:stCondLst>
+                                    <p:cond delay="0"/>
+                                  </p:stCondLst>
+                                  <p:childTnLst>
+                                    <p:set>
+                                      <p:cBhvr>
+                                        <p:cTn id="12" dur="1" fill="hold">
+                                          <p:stCondLst>
+                                            <p:cond delay="0"/>
+                                          </p:stCondLst>
+                                        </p:cTn>
+                                        <p:tgtEl>
+                                          <p:spTgt spid="9">
+                                            <p:txEl>
+                                              <p:pRg st="0" end="0"/>
+                                            </p:txEl>
+                                          </p:spTgt>
+                                        </p:tgtEl>
+                                        <p:attrNameLst>
+                                          <p:attrName>style.visibility</p:attrName>
+                                        </p:attrNameLst>
+                                      </p:cBhvr>
+                                      <p:to>
+                                        <p:strVal val="visible"/>
+                                      </p:to>
+                                    </p:set>
+                                  </p:childTnLst>
+                                </p:cTn>
+                              </p:par>
+                            </p:childTnLst>
+                          </p:cTn>
+                        </p:par>
+                      </p:childTnLst>
+                    </p:cTn>
+                  </p:par>
+                </p:childTnLst>
+              </p:cTn>
+              <p:prevCondLst>
+                <p:cond evt="onPrev" delay="0">
+                  <p:tgtEl>
+                    <p:sldTgt/>
+                  </p:tgtEl>
+                </p:cond>
+              </p:prevCondLst>
+              <p:nextCondLst>
+                <p:cond evt="onNext" delay="0">
+                  <p:tgtEl>
+                    <p:sldTgt/>
+                  </p:tgtEl>
+                </p:cond>
+              </p:nextCondLst>
+            </p:seq>
+          </p:childTnLst>
+        </p:cTn>
+      </p:par>
+    </p:tnLst>
+  </p:timing>
 </p:sld>
 </file>
 

</xml_diff>

<commit_message>
Modified : nicolas comment
</commit_message>
<xml_diff>
--- a/project/presentation.pptx
+++ b/project/presentation.pptx
@@ -5597,7 +5597,18 @@
             </a:r>
             <a:r>
               <a:rPr lang="en-CH" dirty="0"/>
-              <a:t> and classification</a:t>
+              <a:t> and </a:t>
+            </a:r>
+            <a:br>
+              <a:rPr lang="en-US" dirty="0"/>
+            </a:br>
+            <a:r>
+              <a:rPr lang="en-US" dirty="0"/>
+              <a:t>      </a:t>
+            </a:r>
+            <a:r>
+              <a:rPr lang="en-CH" dirty="0"/>
+              <a:t>classification</a:t>
             </a:r>
             <a:r>
               <a:rPr lang="fr-CH" dirty="0"/>
@@ -6430,12 +6441,8 @@
               <a:buNone/>
             </a:pPr>
             <a:r>
-              <a:rPr lang="fr-CH" dirty="0" err="1"/>
-              <a:t>Number</a:t>
-            </a:r>
-            <a:r>
-              <a:rPr lang="fr-CH" dirty="0"/>
-              <a:t> of contours</a:t>
+              <a:rPr lang="fr-CH" dirty="0"/>
+              <a:t>Numbers of contours</a:t>
             </a:r>
           </a:p>
           <a:p>
@@ -6648,8 +6655,8 @@
         </p:nvSpPr>
         <p:spPr>
           <a:xfrm>
-            <a:off x="695739" y="4979504"/>
-            <a:ext cx="1110240" cy="276999"/>
+            <a:off x="602019" y="4716491"/>
+            <a:ext cx="801181" cy="276999"/>
           </a:xfrm>
           <a:prstGeom prst="rect">
             <a:avLst/>
@@ -6660,18 +6667,25 @@
           <a:bodyPr wrap="square" rtlCol="0">
             <a:spAutoFit/>
           </a:bodyPr>
-          <a:lstStyle/>
-          <a:p>
-            <a:r>
-              <a:rPr lang="en-CH" sz="1200" dirty="0"/>
+          <a:lstStyle>
+            <a:defPPr>
+              <a:defRPr lang="en-CH"/>
+            </a:defPPr>
+            <a:lvl1pPr>
+              <a:defRPr sz="1200"/>
+            </a:lvl1pPr>
+          </a:lstStyle>
+          <a:p>
+            <a:r>
+              <a:rPr lang="en-CH" dirty="0"/>
               <a:t>co</a:t>
             </a:r>
             <a:r>
-              <a:rPr lang="fr-CH" sz="1200" dirty="0"/>
+              <a:rPr lang="fr-CH" dirty="0"/>
               <a:t>n</a:t>
             </a:r>
             <a:r>
-              <a:rPr lang="en-CH" sz="1200" dirty="0"/>
+              <a:rPr lang="en-CH" dirty="0"/>
               <a:t>v (5,5)</a:t>
             </a:r>
           </a:p>
@@ -6691,8 +6705,8 @@
         </p:nvSpPr>
         <p:spPr>
           <a:xfrm>
-            <a:off x="1489736" y="4979504"/>
-            <a:ext cx="1533881" cy="369332"/>
+            <a:off x="1428447" y="4716492"/>
+            <a:ext cx="1085746" cy="276999"/>
           </a:xfrm>
           <a:prstGeom prst="rect">
             <a:avLst/>
@@ -6706,7 +6720,7 @@
           <a:lstStyle/>
           <a:p>
             <a:r>
-              <a:rPr lang="en-CH" dirty="0"/>
+              <a:rPr lang="en-CH" sz="1200" dirty="0"/>
               <a:t>max pool (2,2)</a:t>
             </a:r>
           </a:p>
@@ -6726,8 +6740,8 @@
         </p:nvSpPr>
         <p:spPr>
           <a:xfrm>
-            <a:off x="3118445" y="4979504"/>
-            <a:ext cx="1110240" cy="369332"/>
+            <a:off x="2506792" y="4716492"/>
+            <a:ext cx="801181" cy="276999"/>
           </a:xfrm>
           <a:prstGeom prst="rect">
             <a:avLst/>
@@ -6741,15 +6755,15 @@
           <a:lstStyle/>
           <a:p>
             <a:r>
-              <a:rPr lang="en-CH" dirty="0"/>
+              <a:rPr lang="en-CH" sz="1200" dirty="0"/>
               <a:t>co</a:t>
             </a:r>
             <a:r>
-              <a:rPr lang="fr-CH" dirty="0"/>
+              <a:rPr lang="fr-CH" sz="1200" dirty="0"/>
               <a:t>n</a:t>
             </a:r>
             <a:r>
-              <a:rPr lang="en-CH" dirty="0"/>
+              <a:rPr lang="en-CH" sz="1200" dirty="0"/>
               <a:t>v (3,3)</a:t>
             </a:r>
           </a:p>
@@ -6769,8 +6783,8 @@
         </p:nvSpPr>
         <p:spPr>
           <a:xfrm>
-            <a:off x="4256257" y="4989443"/>
-            <a:ext cx="1533881" cy="369332"/>
+            <a:off x="3307973" y="4716493"/>
+            <a:ext cx="1085746" cy="276999"/>
           </a:xfrm>
           <a:prstGeom prst="rect">
             <a:avLst/>
@@ -6784,7 +6798,7 @@
           <a:lstStyle/>
           <a:p>
             <a:r>
-              <a:rPr lang="en-CH" dirty="0"/>
+              <a:rPr lang="en-CH" sz="1200" dirty="0"/>
               <a:t>max pool (2,2)</a:t>
             </a:r>
           </a:p>
@@ -6804,8 +6818,8 @@
         </p:nvSpPr>
         <p:spPr>
           <a:xfrm>
-            <a:off x="6480278" y="5071837"/>
-            <a:ext cx="411844" cy="369332"/>
+            <a:off x="6338276" y="4716495"/>
+            <a:ext cx="335605" cy="276999"/>
           </a:xfrm>
           <a:prstGeom prst="rect">
             <a:avLst/>
@@ -6819,11 +6833,11 @@
           <a:lstStyle/>
           <a:p>
             <a:r>
-              <a:rPr lang="fr-CH" dirty="0"/>
+              <a:rPr lang="fr-CH" sz="1200" dirty="0"/>
               <a:t>F</a:t>
             </a:r>
             <a:r>
-              <a:rPr lang="en-CH" dirty="0"/>
+              <a:rPr lang="en-CH" sz="1200" dirty="0"/>
               <a:t>C</a:t>
             </a:r>
           </a:p>
@@ -6843,8 +6857,8 @@
         </p:nvSpPr>
         <p:spPr>
           <a:xfrm>
-            <a:off x="5720009" y="5027132"/>
-            <a:ext cx="411844" cy="369332"/>
+            <a:off x="4767521" y="4716494"/>
+            <a:ext cx="335605" cy="276999"/>
           </a:xfrm>
           <a:prstGeom prst="rect">
             <a:avLst/>
@@ -6858,11 +6872,11 @@
           <a:lstStyle/>
           <a:p>
             <a:r>
-              <a:rPr lang="fr-CH" dirty="0"/>
+              <a:rPr lang="fr-CH" sz="1200" dirty="0"/>
               <a:t>F</a:t>
             </a:r>
             <a:r>
-              <a:rPr lang="en-CH" dirty="0"/>
+              <a:rPr lang="en-CH" sz="1200" dirty="0"/>
               <a:t>C</a:t>
             </a:r>
           </a:p>
@@ -6882,8 +6896,8 @@
         </p:nvSpPr>
         <p:spPr>
           <a:xfrm>
-            <a:off x="6047373" y="5164170"/>
-            <a:ext cx="411844" cy="369332"/>
+            <a:off x="5799723" y="4716495"/>
+            <a:ext cx="335605" cy="276999"/>
           </a:xfrm>
           <a:prstGeom prst="rect">
             <a:avLst/>
@@ -6897,11 +6911,11 @@
           <a:lstStyle/>
           <a:p>
             <a:r>
-              <a:rPr lang="fr-CH" dirty="0"/>
+              <a:rPr lang="fr-CH" sz="1200" dirty="0"/>
               <a:t>F</a:t>
             </a:r>
             <a:r>
-              <a:rPr lang="en-CH" dirty="0"/>
+              <a:rPr lang="en-CH" sz="1200" dirty="0"/>
               <a:t>C</a:t>
             </a:r>
           </a:p>
@@ -7705,8 +7719,8 @@
         </p:nvSpPr>
         <p:spPr>
           <a:xfrm>
-            <a:off x="1317909" y="5580509"/>
-            <a:ext cx="9533957" cy="461665"/>
+            <a:off x="440640" y="5580509"/>
+            <a:ext cx="11507574" cy="461665"/>
           </a:xfrm>
           <a:prstGeom prst="rect">
             <a:avLst/>
@@ -7720,8 +7734,12 @@
           <a:lstStyle/>
           <a:p>
             <a:r>
+              <a:rPr lang="en-US" sz="2400" dirty="0"/>
+              <a:t>Differentiation</a:t>
+            </a:r>
+            <a:r>
               <a:rPr lang="fr-CH" sz="2400" dirty="0"/>
-              <a:t>A</a:t>
+              <a:t> : A</a:t>
             </a:r>
             <a:r>
               <a:rPr lang="en-CH" sz="2400" dirty="0"/>

</xml_diff>

<commit_message>
modified: math operator correction
</commit_message>
<xml_diff>
--- a/project/presentation.pptx
+++ b/project/presentation.pptx
@@ -293,7 +293,7 @@
           <a:p>
             <a:fld id="{95958476-0E0D-41FB-AEF8-71DC4C6B8094}" type="slidenum">
               <a:rPr lang="en-CH" smtClean="0"/>
-              <a:t>‹#›</a:t>
+              <a:t>‹N°›</a:t>
             </a:fld>
             <a:endParaRPr lang="en-CH"/>
           </a:p>
@@ -551,7 +551,7 @@
           <a:p>
             <a:fld id="{8D831FAA-BA95-4114-814B-804161916173}" type="slidenum">
               <a:rPr lang="en-CH" smtClean="0"/>
-              <a:t>‹#›</a:t>
+              <a:t>‹N°›</a:t>
             </a:fld>
             <a:endParaRPr lang="en-CH"/>
           </a:p>
@@ -1393,7 +1393,7 @@
           <a:p>
             <a:fld id="{D3EB5E2A-433B-448B-927D-175968ECC449}" type="slidenum">
               <a:rPr lang="en-CH" smtClean="0"/>
-              <a:t>‹#›</a:t>
+              <a:t>‹N°›</a:t>
             </a:fld>
             <a:endParaRPr lang="en-CH"/>
           </a:p>
@@ -1592,7 +1592,7 @@
           <a:p>
             <a:fld id="{D3EB5E2A-433B-448B-927D-175968ECC449}" type="slidenum">
               <a:rPr lang="en-CH" smtClean="0"/>
-              <a:t>‹#›</a:t>
+              <a:t>‹N°›</a:t>
             </a:fld>
             <a:endParaRPr lang="en-CH"/>
           </a:p>
@@ -1801,7 +1801,7 @@
           <a:p>
             <a:fld id="{D3EB5E2A-433B-448B-927D-175968ECC449}" type="slidenum">
               <a:rPr lang="en-CH" smtClean="0"/>
-              <a:t>‹#›</a:t>
+              <a:t>‹N°›</a:t>
             </a:fld>
             <a:endParaRPr lang="en-CH"/>
           </a:p>
@@ -2010,7 +2010,7 @@
           <a:p>
             <a:fld id="{D3EB5E2A-433B-448B-927D-175968ECC449}" type="slidenum">
               <a:rPr lang="en-CH" smtClean="0"/>
-              <a:t>‹#›</a:t>
+              <a:t>‹N°›</a:t>
             </a:fld>
             <a:endParaRPr lang="en-CH"/>
           </a:p>
@@ -2285,7 +2285,7 @@
           <a:p>
             <a:fld id="{D3EB5E2A-433B-448B-927D-175968ECC449}" type="slidenum">
               <a:rPr lang="en-CH" smtClean="0"/>
-              <a:t>‹#›</a:t>
+              <a:t>‹N°›</a:t>
             </a:fld>
             <a:endParaRPr lang="en-CH"/>
           </a:p>
@@ -2552,7 +2552,7 @@
           <a:p>
             <a:fld id="{D3EB5E2A-433B-448B-927D-175968ECC449}" type="slidenum">
               <a:rPr lang="en-CH" smtClean="0"/>
-              <a:t>‹#›</a:t>
+              <a:t>‹N°›</a:t>
             </a:fld>
             <a:endParaRPr lang="en-CH"/>
           </a:p>
@@ -2966,7 +2966,7 @@
           <a:p>
             <a:fld id="{D3EB5E2A-433B-448B-927D-175968ECC449}" type="slidenum">
               <a:rPr lang="en-CH" smtClean="0"/>
-              <a:t>‹#›</a:t>
+              <a:t>‹N°›</a:t>
             </a:fld>
             <a:endParaRPr lang="en-CH"/>
           </a:p>
@@ -3107,7 +3107,7 @@
           <a:p>
             <a:fld id="{D3EB5E2A-433B-448B-927D-175968ECC449}" type="slidenum">
               <a:rPr lang="en-CH" smtClean="0"/>
-              <a:t>‹#›</a:t>
+              <a:t>‹N°›</a:t>
             </a:fld>
             <a:endParaRPr lang="en-CH"/>
           </a:p>
@@ -3219,7 +3219,7 @@
           <a:p>
             <a:fld id="{D3EB5E2A-433B-448B-927D-175968ECC449}" type="slidenum">
               <a:rPr lang="en-CH" smtClean="0"/>
-              <a:t>‹#›</a:t>
+              <a:t>‹N°›</a:t>
             </a:fld>
             <a:endParaRPr lang="en-CH"/>
           </a:p>
@@ -3531,7 +3531,7 @@
           <a:p>
             <a:fld id="{D3EB5E2A-433B-448B-927D-175968ECC449}" type="slidenum">
               <a:rPr lang="en-CH" smtClean="0"/>
-              <a:t>‹#›</a:t>
+              <a:t>‹N°›</a:t>
             </a:fld>
             <a:endParaRPr lang="en-CH"/>
           </a:p>
@@ -3819,7 +3819,7 @@
           <a:p>
             <a:fld id="{D3EB5E2A-433B-448B-927D-175968ECC449}" type="slidenum">
               <a:rPr lang="en-CH" smtClean="0"/>
-              <a:t>‹#›</a:t>
+              <a:t>‹N°›</a:t>
             </a:fld>
             <a:endParaRPr lang="en-CH"/>
           </a:p>
@@ -4097,7 +4097,7 @@
           <a:p>
             <a:fld id="{D3EB5E2A-433B-448B-927D-175968ECC449}" type="slidenum">
               <a:rPr lang="en-CH" smtClean="0"/>
-              <a:t>‹#›</a:t>
+              <a:t>‹N°›</a:t>
             </a:fld>
             <a:endParaRPr lang="en-CH" dirty="0"/>
           </a:p>
@@ -5024,7 +5024,7 @@
           <a:lstStyle/>
           <a:p>
             <a:r>
-              <a:rPr lang="en-CH"/>
+              <a:rPr lang="en-CH" dirty="0"/>
               <a:t>21/04/2020</a:t>
             </a:r>
           </a:p>
@@ -6493,8 +6493,12 @@
           <a:p>
             <a:pPr lvl="2"/>
             <a:r>
-              <a:rPr lang="en-CH" dirty="0"/>
-              <a:t>&lt; 2 =&gt; ‘-’</a:t>
+              <a:rPr lang="fr-CH" dirty="0"/>
+              <a:t>&gt;</a:t>
+            </a:r>
+            <a:r>
+              <a:rPr lang="en-CH" dirty="0"/>
+              <a:t> 2 =&gt; ‘-’</a:t>
             </a:r>
             <a:endParaRPr lang="fr-CH" dirty="0"/>
           </a:p>

</xml_diff>

<commit_message>
Modified : change date
</commit_message>
<xml_diff>
--- a/project/presentation.pptx
+++ b/project/presentation.pptx
@@ -4770,8 +4770,24 @@
           <a:lstStyle/>
           <a:p>
             <a:r>
-              <a:rPr lang="en-CH"/>
-              <a:t>21/04/2020</a:t>
+              <a:rPr lang="en-CH" dirty="0"/>
+              <a:t>2</a:t>
+            </a:r>
+            <a:r>
+              <a:rPr lang="en-US" dirty="0"/>
+              <a:t>8</a:t>
+            </a:r>
+            <a:r>
+              <a:rPr lang="en-CH" dirty="0"/>
+              <a:t>/0</a:t>
+            </a:r>
+            <a:r>
+              <a:rPr lang="en-US" dirty="0"/>
+              <a:t>5</a:t>
+            </a:r>
+            <a:r>
+              <a:rPr lang="en-CH" dirty="0"/>
+              <a:t>/2020</a:t>
             </a:r>
           </a:p>
         </p:txBody>
@@ -5025,7 +5041,23 @@
           <a:p>
             <a:r>
               <a:rPr lang="en-CH" dirty="0"/>
-              <a:t>21/04/2020</a:t>
+              <a:t>2</a:t>
+            </a:r>
+            <a:r>
+              <a:rPr lang="en-US" dirty="0"/>
+              <a:t>8</a:t>
+            </a:r>
+            <a:r>
+              <a:rPr lang="en-CH" dirty="0"/>
+              <a:t>/0</a:t>
+            </a:r>
+            <a:r>
+              <a:rPr lang="en-US" dirty="0"/>
+              <a:t>5</a:t>
+            </a:r>
+            <a:r>
+              <a:rPr lang="en-CH" dirty="0"/>
+              <a:t>/2020</a:t>
             </a:r>
           </a:p>
         </p:txBody>
@@ -6168,8 +6200,24 @@
           <a:lstStyle/>
           <a:p>
             <a:r>
-              <a:rPr lang="en-CH"/>
-              <a:t>21/04/2020</a:t>
+              <a:rPr lang="en-CH" dirty="0"/>
+              <a:t>2</a:t>
+            </a:r>
+            <a:r>
+              <a:rPr lang="en-US" dirty="0"/>
+              <a:t>8</a:t>
+            </a:r>
+            <a:r>
+              <a:rPr lang="en-CH" dirty="0"/>
+              <a:t>/0</a:t>
+            </a:r>
+            <a:r>
+              <a:rPr lang="en-US" dirty="0"/>
+              <a:t>5</a:t>
+            </a:r>
+            <a:r>
+              <a:rPr lang="en-CH" dirty="0"/>
+              <a:t>/2020</a:t>
             </a:r>
           </a:p>
         </p:txBody>
@@ -6643,8 +6691,24 @@
           <a:lstStyle/>
           <a:p>
             <a:r>
-              <a:rPr lang="en-CH"/>
-              <a:t>21/04/2020</a:t>
+              <a:rPr lang="en-CH" dirty="0"/>
+              <a:t>2</a:t>
+            </a:r>
+            <a:r>
+              <a:rPr lang="en-US" dirty="0"/>
+              <a:t>8</a:t>
+            </a:r>
+            <a:r>
+              <a:rPr lang="en-CH" dirty="0"/>
+              <a:t>/0</a:t>
+            </a:r>
+            <a:r>
+              <a:rPr lang="en-US" dirty="0"/>
+              <a:t>5</a:t>
+            </a:r>
+            <a:r>
+              <a:rPr lang="en-CH" dirty="0"/>
+              <a:t>/2020</a:t>
             </a:r>
           </a:p>
         </p:txBody>
@@ -7746,8 +7810,24 @@
           <a:lstStyle/>
           <a:p>
             <a:r>
-              <a:rPr lang="en-CH"/>
-              <a:t>21/04/2020</a:t>
+              <a:rPr lang="en-CH" dirty="0"/>
+              <a:t>2</a:t>
+            </a:r>
+            <a:r>
+              <a:rPr lang="en-US" dirty="0"/>
+              <a:t>8</a:t>
+            </a:r>
+            <a:r>
+              <a:rPr lang="en-CH" dirty="0"/>
+              <a:t>/0</a:t>
+            </a:r>
+            <a:r>
+              <a:rPr lang="en-US" dirty="0"/>
+              <a:t>5</a:t>
+            </a:r>
+            <a:r>
+              <a:rPr lang="en-CH" dirty="0"/>
+              <a:t>/2020</a:t>
             </a:r>
           </a:p>
         </p:txBody>

</xml_diff>